<commit_message>
update links in presentations
</commit_message>
<xml_diff>
--- a/VI69/PRESENTATION.pptx
+++ b/VI69/PRESENTATION.pptx
@@ -39,7 +39,7 @@
     <p:sldId id="266" r:id="rId33"/>
     <p:sldId id="284" r:id="rId34"/>
     <p:sldId id="267" r:id="rId35"/>
-    <p:sldId id="292" r:id="rId36"/>
+    <p:sldId id="293" r:id="rId36"/>
     <p:sldId id="268" r:id="rId37"/>
   </p:sldIdLst>
   <p:sldSz cx="9144000" cy="5143500" type="screen16x9"/>
@@ -4277,11 +4277,7 @@
           <a:p>
             <a:r>
               <a:rPr lang="en-US" dirty="0" smtClean="0"/>
-              <a:t>VI-69: Tech Titans: </a:t>
-            </a:r>
-            <a:r>
-              <a:rPr lang="en-US" dirty="0" smtClean="0"/>
-              <a:t>Best Practices for Building a Bridge to Unlock the Power </a:t>
+              <a:t>VI-69: Tech Titans: Best Practices for Building a Bridge to Unlock the Power </a:t>
             </a:r>
             <a:r>
               <a:rPr lang="en-US" dirty="0" err="1" smtClean="0"/>
@@ -16574,7 +16570,7 @@
           <a:p>
             <a:r>
               <a:rPr lang="en-US" dirty="0" smtClean="0"/>
-              <a:t>Where to find more info</a:t>
+              <a:t>Links and Downloads</a:t>
             </a:r>
             <a:endParaRPr lang="en-US" dirty="0"/>
           </a:p>
@@ -16668,25 +16664,84 @@
           <a:p>
             <a:r>
               <a:rPr lang="en-US" dirty="0" smtClean="0"/>
-              <a:t>Read through the “DeltekVisionXtend7xWebServicesAPI.pdf”. Part of the documentation download</a:t>
-            </a:r>
-          </a:p>
-          <a:p>
+              <a:t>You can find </a:t>
+            </a:r>
+            <a:r>
+              <a:rPr lang="en-US" dirty="0"/>
+              <a:t>all source code </a:t>
+            </a:r>
             <a:r>
               <a:rPr lang="en-US" dirty="0" smtClean="0"/>
-              <a:t>Samples and presentation can be found </a:t>
-            </a:r>
-            <a:r>
-              <a:rPr lang="en-US"/>
-              <a:t>here</a:t>
-            </a:r>
+              <a:t>on GitHub </a:t>
+            </a:r>
+            <a:r>
+              <a:rPr lang="en-US" dirty="0"/>
+              <a:t>here:</a:t>
+            </a:r>
+            <a:br>
+              <a:rPr lang="en-US" dirty="0"/>
+            </a:br>
+            <a:r>
+              <a:rPr lang="en-US" dirty="0">
+                <a:hlinkClick r:id="rId2"/>
+              </a:rPr>
+              <a:t>https</a:t>
+            </a:r>
+            <a:r>
+              <a:rPr lang="en-US">
+                <a:hlinkClick r:id="rId2"/>
+              </a:rPr>
+              <a:t>://</a:t>
+            </a:r>
+            <a:r>
+              <a:rPr lang="en-US" smtClean="0">
+                <a:hlinkClick r:id="rId2"/>
+              </a:rPr>
+              <a:t>github.com/mdobler/Insight2015/tree/master/VI69</a:t>
+            </a:r>
+            <a:endParaRPr lang="en-US" smtClean="0"/>
+          </a:p>
+          <a:p>
             <a:r>
               <a:rPr lang="en-US" smtClean="0"/>
-              <a:t>: &lt;TBD&gt;</a:t>
-            </a:r>
-            <a:endParaRPr lang="en-US" dirty="0" smtClean="0"/>
-          </a:p>
-          <a:p>
+              <a:t>All </a:t>
+            </a:r>
+            <a:r>
+              <a:rPr lang="en-US" dirty="0" smtClean="0"/>
+              <a:t>demos use the VisionDemo74 database (can be downloaded from the Deltek support site; </a:t>
+            </a:r>
+            <a:r>
+              <a:rPr lang="en-US" dirty="0" smtClean="0">
+                <a:hlinkClick r:id="rId3"/>
+              </a:rPr>
+              <a:t>http://support.Deltek.com</a:t>
+            </a:r>
+            <a:r>
+              <a:rPr lang="en-US" dirty="0" smtClean="0"/>
+              <a:t> )</a:t>
+            </a:r>
+          </a:p>
+          <a:p>
+            <a:r>
+              <a:rPr lang="en-US" dirty="0" smtClean="0"/>
+              <a:t>I am available at the “Ask The Expert” sessions</a:t>
+            </a:r>
+          </a:p>
+          <a:p>
+            <a:r>
+              <a:rPr lang="en-US" dirty="0" smtClean="0"/>
+              <a:t>Email me: Mike Dobler ( </a:t>
+            </a:r>
+            <a:r>
+              <a:rPr lang="en-US" dirty="0" smtClean="0">
+                <a:hlinkClick r:id="rId4"/>
+              </a:rPr>
+              <a:t>michaeldobler@Deltek.com</a:t>
+            </a:r>
+            <a:r>
+              <a:rPr lang="en-US" dirty="0" smtClean="0"/>
+              <a:t> )</a:t>
+            </a:r>
             <a:endParaRPr lang="en-US" dirty="0"/>
           </a:p>
         </p:txBody>
@@ -16694,7 +16749,7 @@
     </p:spTree>
     <p:extLst>
       <p:ext uri="{BB962C8B-B14F-4D97-AF65-F5344CB8AC3E}">
-        <p14:creationId xmlns:p14="http://schemas.microsoft.com/office/powerpoint/2010/main" val="2141485624"/>
+        <p14:creationId xmlns:p14="http://schemas.microsoft.com/office/powerpoint/2010/main" val="3181369035"/>
       </p:ext>
     </p:extLst>
   </p:cSld>

</xml_diff>